<commit_message>
Relazione e presentazione concluse.
</commit_message>
<xml_diff>
--- a/Esame/presentazione.pptx
+++ b/Esame/presentazione.pptx
@@ -6,10 +6,13 @@
   </p:sldMasterIdLst>
   <p:sldIdLst>
     <p:sldId id="256" r:id="rId2"/>
-    <p:sldId id="257" r:id="rId3"/>
+    <p:sldId id="262" r:id="rId3"/>
     <p:sldId id="258" r:id="rId4"/>
     <p:sldId id="259" r:id="rId5"/>
     <p:sldId id="260" r:id="rId6"/>
+    <p:sldId id="263" r:id="rId7"/>
+    <p:sldId id="264" r:id="rId8"/>
+    <p:sldId id="265" r:id="rId9"/>
   </p:sldIdLst>
   <p:sldSz cx="9144000" cy="6858000" type="screen4x3"/>
   <p:notesSz cx="6858000" cy="9144000"/>
@@ -14588,30 +14591,45 @@
         </p:nvSpPr>
         <p:spPr>
           <a:xfrm>
-            <a:off x="611560" y="476672"/>
-            <a:ext cx="7772400" cy="1780108"/>
+            <a:off x="539552" y="404664"/>
+            <a:ext cx="7772400" cy="2592288"/>
           </a:xfrm>
         </p:spPr>
         <p:txBody>
           <a:bodyPr>
-            <a:normAutofit/>
+            <a:normAutofit fontScale="90000"/>
           </a:bodyPr>
           <a:lstStyle/>
           <a:p>
             <a:r>
-              <a:rPr lang="it-IT" dirty="0" smtClean="0"/>
-              <a:t>Progetto di: Fenili Lorenzo,</a:t>
+              <a:rPr lang="it-IT" b="1" dirty="0" smtClean="0"/>
+              <a:t/>
             </a:r>
             <a:br>
-              <a:rPr lang="it-IT" dirty="0" smtClean="0"/>
+              <a:rPr lang="it-IT" b="1" dirty="0" smtClean="0"/>
             </a:br>
             <a:r>
-              <a:rPr lang="it-IT" dirty="0" err="1" smtClean="0"/>
-              <a:t>Perico</a:t>
+              <a:rPr lang="it-IT" b="1" dirty="0" smtClean="0"/>
+              <a:t>Programmazione </a:t>
             </a:r>
             <a:r>
-              <a:rPr lang="it-IT" dirty="0" smtClean="0"/>
-              <a:t> Luca e Messi Silvio</a:t>
+              <a:rPr lang="it-IT" b="1" dirty="0"/>
+              <a:t>e Amministrazione di Sistema</a:t>
+            </a:r>
+            <a:br>
+              <a:rPr lang="it-IT" b="1" dirty="0"/>
+            </a:br>
+            <a:r>
+              <a:rPr lang="en-US" dirty="0" err="1" smtClean="0"/>
+              <a:t>Progetto</a:t>
+            </a:r>
+            <a:r>
+              <a:rPr lang="en-US" dirty="0" smtClean="0"/>
+              <a:t> </a:t>
+            </a:r>
+            <a:r>
+              <a:rPr lang="en-US" dirty="0"/>
+              <a:t>C#</a:t>
             </a:r>
             <a:endParaRPr lang="it-IT" dirty="0"/>
           </a:p>
@@ -14629,7 +14647,7 @@
         </p:nvSpPr>
         <p:spPr>
           <a:xfrm>
-            <a:off x="1115616" y="2564904"/>
+            <a:off x="1115616" y="3501008"/>
             <a:ext cx="6400800" cy="1473200"/>
           </a:xfrm>
         </p:spPr>
@@ -14641,7 +14659,19 @@
           <a:p>
             <a:r>
               <a:rPr lang="it-IT" sz="4400" dirty="0" smtClean="0"/>
-              <a:t>Scopo del progetto:  analisi di dati ricevuti da sensori applicati sul corpo umano</a:t>
+              <a:t> </a:t>
+            </a:r>
+            <a:r>
+              <a:rPr lang="it-IT" sz="4400" dirty="0" smtClean="0"/>
+              <a:t>analisi di dati ricevuti da sensori applicati </a:t>
+            </a:r>
+            <a:r>
+              <a:rPr lang="it-IT" sz="4400" dirty="0" smtClean="0"/>
+              <a:t>sul </a:t>
+            </a:r>
+            <a:r>
+              <a:rPr lang="it-IT" sz="4400" dirty="0" smtClean="0"/>
+              <a:t>corpo umano</a:t>
             </a:r>
             <a:endParaRPr lang="it-IT" sz="4400" dirty="0"/>
           </a:p>
@@ -14669,7 +14699,7 @@
         </p:blipFill>
         <p:spPr>
           <a:xfrm>
-            <a:off x="7308304" y="5713922"/>
+            <a:off x="683568" y="5653674"/>
             <a:ext cx="1835696" cy="1144078"/>
           </a:xfrm>
           <a:prstGeom prst="rect">
@@ -14726,8 +14756,8 @@
         </p:nvSpPr>
         <p:spPr>
           <a:xfrm>
-            <a:off x="611560" y="332656"/>
-            <a:ext cx="7772400" cy="916012"/>
+            <a:off x="611560" y="476672"/>
+            <a:ext cx="7772400" cy="1008112"/>
           </a:xfrm>
         </p:spPr>
         <p:txBody>
@@ -14738,7 +14768,7 @@
           <a:p>
             <a:r>
               <a:rPr lang="it-IT" dirty="0" smtClean="0"/>
-              <a:t>Punti forti del progetto:</a:t>
+              <a:t>ACQUISIZIONE DATI</a:t>
             </a:r>
             <a:endParaRPr lang="it-IT" dirty="0"/>
           </a:p>
@@ -14756,8 +14786,8 @@
         </p:nvSpPr>
         <p:spPr>
           <a:xfrm>
-            <a:off x="1259632" y="1484784"/>
-            <a:ext cx="6400800" cy="1473200"/>
+            <a:off x="979138" y="1636856"/>
+            <a:ext cx="7049246" cy="3376319"/>
           </a:xfrm>
         </p:spPr>
         <p:txBody>
@@ -14768,7 +14798,7 @@
           <a:p>
             <a:pPr algn="l"/>
             <a:r>
-              <a:rPr lang="it-IT" sz="3200" dirty="0" smtClean="0">
+              <a:rPr lang="it-IT" sz="4400" dirty="0">
                 <a:solidFill>
                   <a:schemeClr val="bg1"/>
                 </a:solidFill>
@@ -14779,7 +14809,7 @@
           <a:p>
             <a:pPr algn="l"/>
             <a:r>
-              <a:rPr lang="it-IT" sz="3200" dirty="0" smtClean="0">
+              <a:rPr lang="it-IT" sz="4400" dirty="0">
                 <a:solidFill>
                   <a:schemeClr val="bg1"/>
                 </a:solidFill>
@@ -14790,7 +14820,7 @@
           <a:p>
             <a:pPr algn="l"/>
             <a:r>
-              <a:rPr lang="it-IT" sz="3200" dirty="0" smtClean="0">
+              <a:rPr lang="it-IT" sz="4400" dirty="0">
                 <a:solidFill>
                   <a:schemeClr val="bg1"/>
                 </a:solidFill>
@@ -14798,58 +14828,12 @@
               <a:t>3.Gestione degli eventi a cavallo delle finestre</a:t>
             </a:r>
           </a:p>
-          <a:p>
-            <a:pPr algn="l"/>
-            <a:r>
-              <a:rPr lang="it-IT" sz="3200" smtClean="0">
-                <a:solidFill>
-                  <a:schemeClr val="bg1"/>
-                </a:solidFill>
-              </a:rPr>
-              <a:t>4.Gestione multithreading </a:t>
-            </a:r>
-            <a:endParaRPr lang="it-IT" sz="3200" dirty="0" smtClean="0">
-              <a:solidFill>
-                <a:schemeClr val="bg1"/>
-              </a:solidFill>
-            </a:endParaRPr>
-          </a:p>
         </p:txBody>
       </p:sp>
-      <p:pic>
-        <p:nvPicPr>
-          <p:cNvPr id="4" name="Immagine 3"/>
-          <p:cNvPicPr>
-            <a:picLocks noChangeAspect="1"/>
-          </p:cNvPicPr>
-          <p:nvPr/>
-        </p:nvPicPr>
-        <p:blipFill>
-          <a:blip r:embed="rId2">
-            <a:extLst>
-              <a:ext uri="{28A0092B-C50C-407E-A947-70E740481C1C}">
-                <a14:useLocalDpi xmlns:a14="http://schemas.microsoft.com/office/drawing/2010/main" val="0"/>
-              </a:ext>
-            </a:extLst>
-          </a:blip>
-          <a:stretch>
-            <a:fillRect/>
-          </a:stretch>
-        </p:blipFill>
-        <p:spPr>
-          <a:xfrm>
-            <a:off x="7308304" y="5713922"/>
-            <a:ext cx="1835696" cy="1144078"/>
-          </a:xfrm>
-          <a:prstGeom prst="rect">
-            <a:avLst/>
-          </a:prstGeom>
-        </p:spPr>
-      </p:pic>
     </p:spTree>
     <p:extLst>
       <p:ext uri="{BB962C8B-B14F-4D97-AF65-F5344CB8AC3E}">
-        <p14:creationId xmlns:p14="http://schemas.microsoft.com/office/powerpoint/2010/main" val="788404861"/>
+        <p14:creationId xmlns:p14="http://schemas.microsoft.com/office/powerpoint/2010/main" val="470608602"/>
       </p:ext>
     </p:extLst>
   </p:cSld>
@@ -14915,7 +14899,7 @@
       </p:sp>
       <p:pic>
         <p:nvPicPr>
-          <p:cNvPr id="4" name="Immagine 3"/>
+          <p:cNvPr id="6" name="Immagine 5"/>
           <p:cNvPicPr>
             <a:picLocks noChangeAspect="1"/>
           </p:cNvPicPr>
@@ -14923,36 +14907,6 @@
         </p:nvPicPr>
         <p:blipFill>
           <a:blip r:embed="rId2">
-            <a:extLst>
-              <a:ext uri="{28A0092B-C50C-407E-A947-70E740481C1C}">
-                <a14:useLocalDpi xmlns:a14="http://schemas.microsoft.com/office/drawing/2010/main" val="0"/>
-              </a:ext>
-            </a:extLst>
-          </a:blip>
-          <a:stretch>
-            <a:fillRect/>
-          </a:stretch>
-        </p:blipFill>
-        <p:spPr>
-          <a:xfrm>
-            <a:off x="7308304" y="5713922"/>
-            <a:ext cx="1835696" cy="1144078"/>
-          </a:xfrm>
-          <a:prstGeom prst="rect">
-            <a:avLst/>
-          </a:prstGeom>
-        </p:spPr>
-      </p:pic>
-      <p:pic>
-        <p:nvPicPr>
-          <p:cNvPr id="6" name="Immagine 5"/>
-          <p:cNvPicPr>
-            <a:picLocks noChangeAspect="1"/>
-          </p:cNvPicPr>
-          <p:nvPr/>
-        </p:nvPicPr>
-        <p:blipFill>
-          <a:blip r:embed="rId3">
             <a:extLst>
               <a:ext uri="{28A0092B-C50C-407E-A947-70E740481C1C}">
                 <a14:useLocalDpi xmlns:a14="http://schemas.microsoft.com/office/drawing/2010/main" val="0"/>
@@ -15078,36 +15032,6 @@
           </a:p>
         </p:txBody>
       </p:sp>
-      <p:pic>
-        <p:nvPicPr>
-          <p:cNvPr id="4" name="Immagine 3"/>
-          <p:cNvPicPr>
-            <a:picLocks noChangeAspect="1"/>
-          </p:cNvPicPr>
-          <p:nvPr/>
-        </p:nvPicPr>
-        <p:blipFill>
-          <a:blip r:embed="rId2">
-            <a:extLst>
-              <a:ext uri="{28A0092B-C50C-407E-A947-70E740481C1C}">
-                <a14:useLocalDpi xmlns:a14="http://schemas.microsoft.com/office/drawing/2010/main" val="0"/>
-              </a:ext>
-            </a:extLst>
-          </a:blip>
-          <a:stretch>
-            <a:fillRect/>
-          </a:stretch>
-        </p:blipFill>
-        <p:spPr>
-          <a:xfrm>
-            <a:off x="7308304" y="5713922"/>
-            <a:ext cx="1835696" cy="1144078"/>
-          </a:xfrm>
-          <a:prstGeom prst="rect">
-            <a:avLst/>
-          </a:prstGeom>
-        </p:spPr>
-      </p:pic>
       <p:sp>
         <p:nvSpPr>
           <p:cNvPr id="3" name="CasellaDiTesto 2"/>
@@ -15153,7 +15077,7 @@
           <p:nvPr/>
         </p:nvPicPr>
         <p:blipFill>
-          <a:blip r:embed="rId3">
+          <a:blip r:embed="rId2">
             <a:extLst>
               <a:ext uri="{28A0092B-C50C-407E-A947-70E740481C1C}">
                 <a14:useLocalDpi xmlns:a14="http://schemas.microsoft.com/office/drawing/2010/main" val="0"/>
@@ -15241,36 +15165,6 @@
           </a:p>
         </p:txBody>
       </p:sp>
-      <p:pic>
-        <p:nvPicPr>
-          <p:cNvPr id="4" name="Immagine 3"/>
-          <p:cNvPicPr>
-            <a:picLocks noChangeAspect="1"/>
-          </p:cNvPicPr>
-          <p:nvPr/>
-        </p:nvPicPr>
-        <p:blipFill>
-          <a:blip r:embed="rId2">
-            <a:extLst>
-              <a:ext uri="{28A0092B-C50C-407E-A947-70E740481C1C}">
-                <a14:useLocalDpi xmlns:a14="http://schemas.microsoft.com/office/drawing/2010/main" val="0"/>
-              </a:ext>
-            </a:extLst>
-          </a:blip>
-          <a:stretch>
-            <a:fillRect/>
-          </a:stretch>
-        </p:blipFill>
-        <p:spPr>
-          <a:xfrm>
-            <a:off x="7308304" y="5713922"/>
-            <a:ext cx="1835696" cy="1144078"/>
-          </a:xfrm>
-          <a:prstGeom prst="rect">
-            <a:avLst/>
-          </a:prstGeom>
-        </p:spPr>
-      </p:pic>
       <p:sp>
         <p:nvSpPr>
           <p:cNvPr id="3" name="CasellaDiTesto 2"/>
@@ -15310,7 +15204,7 @@
           <p:nvPr/>
         </p:nvPicPr>
         <p:blipFill>
-          <a:blip r:embed="rId3">
+          <a:blip r:embed="rId2">
             <a:extLst>
               <a:ext uri="{28A0092B-C50C-407E-A947-70E740481C1C}">
                 <a14:useLocalDpi xmlns:a14="http://schemas.microsoft.com/office/drawing/2010/main" val="0"/>
@@ -15335,6 +15229,614 @@
     <p:extLst>
       <p:ext uri="{BB962C8B-B14F-4D97-AF65-F5344CB8AC3E}">
         <p14:creationId xmlns:p14="http://schemas.microsoft.com/office/powerpoint/2010/main" val="1432211168"/>
+      </p:ext>
+    </p:extLst>
+  </p:cSld>
+  <p:clrMapOvr>
+    <a:masterClrMapping/>
+  </p:clrMapOvr>
+  <p:timing>
+    <p:tnLst>
+      <p:par>
+        <p:cTn id="1" dur="indefinite" restart="never" nodeType="tmRoot"/>
+      </p:par>
+    </p:tnLst>
+  </p:timing>
+</p:sld>
+</file>
+
+<file path=ppt/slides/slide6.xml><?xml version="1.0" encoding="utf-8"?>
+<p:sld xmlns:a="http://schemas.openxmlformats.org/drawingml/2006/main" xmlns:r="http://schemas.openxmlformats.org/officeDocument/2006/relationships" xmlns:p="http://schemas.openxmlformats.org/presentationml/2006/main">
+  <p:cSld>
+    <p:spTree>
+      <p:nvGrpSpPr>
+        <p:cNvPr id="1" name=""/>
+        <p:cNvGrpSpPr/>
+        <p:nvPr/>
+      </p:nvGrpSpPr>
+      <p:grpSpPr>
+        <a:xfrm>
+          <a:off x="0" y="0"/>
+          <a:ext cx="0" cy="0"/>
+          <a:chOff x="0" y="0"/>
+          <a:chExt cx="0" cy="0"/>
+        </a:xfrm>
+      </p:grpSpPr>
+      <p:sp>
+        <p:nvSpPr>
+          <p:cNvPr id="2" name="Titolo 1"/>
+          <p:cNvSpPr>
+            <a:spLocks noGrp="1"/>
+          </p:cNvSpPr>
+          <p:nvPr>
+            <p:ph type="ctrTitle"/>
+          </p:nvPr>
+        </p:nvSpPr>
+        <p:spPr>
+          <a:xfrm>
+            <a:off x="611560" y="476672"/>
+            <a:ext cx="7772400" cy="1008112"/>
+          </a:xfrm>
+        </p:spPr>
+        <p:txBody>
+          <a:bodyPr>
+            <a:normAutofit/>
+          </a:bodyPr>
+          <a:lstStyle/>
+          <a:p>
+            <a:r>
+              <a:rPr lang="it-IT" dirty="0" smtClean="0"/>
+              <a:t>VISUALIZZAZIONE DATI</a:t>
+            </a:r>
+            <a:endParaRPr lang="it-IT" dirty="0"/>
+          </a:p>
+        </p:txBody>
+      </p:sp>
+      <p:sp>
+        <p:nvSpPr>
+          <p:cNvPr id="3" name="Sottotitolo 2"/>
+          <p:cNvSpPr>
+            <a:spLocks noGrp="1"/>
+          </p:cNvSpPr>
+          <p:nvPr>
+            <p:ph type="subTitle" idx="1"/>
+          </p:nvPr>
+        </p:nvSpPr>
+        <p:spPr>
+          <a:xfrm>
+            <a:off x="979138" y="1636856"/>
+            <a:ext cx="7049246" cy="3376319"/>
+          </a:xfrm>
+        </p:spPr>
+        <p:txBody>
+          <a:bodyPr>
+            <a:noAutofit/>
+          </a:bodyPr>
+          <a:lstStyle/>
+          <a:p>
+            <a:pPr algn="l"/>
+            <a:r>
+              <a:rPr lang="it-IT" sz="1400" dirty="0" smtClean="0"/>
+              <a:t>Il programma permette di visualizzare in un unico </a:t>
+            </a:r>
+            <a:r>
+              <a:rPr lang="it-IT" sz="1400" dirty="0" err="1" smtClean="0"/>
+              <a:t>form</a:t>
+            </a:r>
+            <a:r>
+              <a:rPr lang="it-IT" sz="1400" dirty="0" smtClean="0"/>
+              <a:t> 4 grafici in contemporanea. I grafici che si possono visualizzare sono i seguenti:</a:t>
+            </a:r>
+          </a:p>
+          <a:p>
+            <a:pPr marL="285750" lvl="0" indent="-285750" algn="l">
+              <a:buClr>
+                <a:schemeClr val="bg1"/>
+              </a:buClr>
+              <a:buFont typeface="Arial" panose="020B0604020202020204" pitchFamily="34" charset="0"/>
+              <a:buChar char="•"/>
+            </a:pPr>
+            <a:r>
+              <a:rPr lang="it-IT" sz="1400" dirty="0"/>
+              <a:t>modulo dell’accelerometro </a:t>
+            </a:r>
+            <a:endParaRPr lang="it-IT" sz="1400" dirty="0" smtClean="0"/>
+          </a:p>
+          <a:p>
+            <a:pPr marL="285750" lvl="0" indent="-285750" algn="l">
+              <a:buClr>
+                <a:schemeClr val="bg1"/>
+              </a:buClr>
+              <a:buFont typeface="Arial" panose="020B0604020202020204" pitchFamily="34" charset="0"/>
+              <a:buChar char="•"/>
+            </a:pPr>
+            <a:r>
+              <a:rPr lang="it-IT" sz="1400" dirty="0" smtClean="0"/>
+              <a:t>modulo </a:t>
+            </a:r>
+            <a:r>
+              <a:rPr lang="it-IT" sz="1400" dirty="0"/>
+              <a:t>del giroscopio </a:t>
+            </a:r>
+          </a:p>
+          <a:p>
+            <a:pPr marL="285750" lvl="0" indent="-285750" algn="l">
+              <a:buClr>
+                <a:schemeClr val="bg1"/>
+              </a:buClr>
+              <a:buFont typeface="Arial" panose="020B0604020202020204" pitchFamily="34" charset="0"/>
+              <a:buChar char="•"/>
+            </a:pPr>
+            <a:r>
+              <a:rPr lang="it-IT" sz="1400" dirty="0"/>
+              <a:t>angolo  </a:t>
+            </a:r>
+            <a:r>
+              <a:rPr lang="it-IT" sz="1400" dirty="0" smtClean="0"/>
+              <a:t>theta</a:t>
+            </a:r>
+            <a:endParaRPr lang="it-IT" sz="1400" dirty="0"/>
+          </a:p>
+          <a:p>
+            <a:pPr marL="285750" lvl="0" indent="-285750" algn="l">
+              <a:buClr>
+                <a:schemeClr val="bg1"/>
+              </a:buClr>
+              <a:buFont typeface="Arial" panose="020B0604020202020204" pitchFamily="34" charset="0"/>
+              <a:buChar char="•"/>
+            </a:pPr>
+            <a:r>
+              <a:rPr lang="it-IT" sz="1400" dirty="0"/>
+              <a:t>angolo theta senza discontinuità</a:t>
+            </a:r>
+          </a:p>
+          <a:p>
+            <a:pPr marL="285750" lvl="0" indent="-285750" algn="l">
+              <a:buClr>
+                <a:schemeClr val="bg1"/>
+              </a:buClr>
+              <a:buFont typeface="Arial" panose="020B0604020202020204" pitchFamily="34" charset="0"/>
+              <a:buChar char="•"/>
+            </a:pPr>
+            <a:r>
+              <a:rPr lang="it-IT" sz="1400" dirty="0"/>
+              <a:t>deviazione standard del modulo dell’accelerometro/ giroscopio </a:t>
+            </a:r>
+            <a:endParaRPr lang="it-IT" sz="1400" dirty="0" smtClean="0"/>
+          </a:p>
+          <a:p>
+            <a:pPr marL="285750" lvl="0" indent="-285750" algn="l">
+              <a:buClr>
+                <a:schemeClr val="bg1"/>
+              </a:buClr>
+              <a:buFont typeface="Arial" panose="020B0604020202020204" pitchFamily="34" charset="0"/>
+              <a:buChar char="•"/>
+            </a:pPr>
+            <a:r>
+              <a:rPr lang="it-IT" sz="1400" dirty="0" smtClean="0"/>
+              <a:t>angolo </a:t>
+            </a:r>
+            <a:r>
+              <a:rPr lang="it-IT" sz="1400" dirty="0" err="1"/>
+              <a:t>Yaw</a:t>
+            </a:r>
+            <a:endParaRPr lang="it-IT" sz="1400" dirty="0"/>
+          </a:p>
+          <a:p>
+            <a:pPr marL="285750" lvl="0" indent="-285750" algn="l">
+              <a:buClr>
+                <a:schemeClr val="bg1"/>
+              </a:buClr>
+              <a:buFont typeface="Arial" panose="020B0604020202020204" pitchFamily="34" charset="0"/>
+              <a:buChar char="•"/>
+            </a:pPr>
+            <a:r>
+              <a:rPr lang="it-IT" sz="1400" dirty="0"/>
+              <a:t>angolo </a:t>
+            </a:r>
+            <a:r>
+              <a:rPr lang="it-IT" sz="1400" dirty="0" err="1"/>
+              <a:t>Yaw</a:t>
+            </a:r>
+            <a:r>
+              <a:rPr lang="it-IT" sz="1400" dirty="0"/>
+              <a:t> senza discontinuità</a:t>
+            </a:r>
+          </a:p>
+          <a:p>
+            <a:pPr marL="285750" indent="-285750" algn="l">
+              <a:buClr>
+                <a:schemeClr val="bg1"/>
+              </a:buClr>
+              <a:buFont typeface="Arial" panose="020B0604020202020204" pitchFamily="34" charset="0"/>
+              <a:buChar char="•"/>
+            </a:pPr>
+            <a:r>
+              <a:rPr lang="it-IT" sz="1400" dirty="0"/>
+              <a:t>angolo </a:t>
+            </a:r>
+            <a:r>
+              <a:rPr lang="it-IT" sz="1400" dirty="0" smtClean="0"/>
+              <a:t>Pitch</a:t>
+            </a:r>
+            <a:endParaRPr lang="it-IT" sz="1400" dirty="0"/>
+          </a:p>
+          <a:p>
+            <a:pPr marL="285750" lvl="0" indent="-285750" algn="l">
+              <a:buClr>
+                <a:schemeClr val="bg1"/>
+              </a:buClr>
+              <a:buFont typeface="Arial" panose="020B0604020202020204" pitchFamily="34" charset="0"/>
+              <a:buChar char="•"/>
+            </a:pPr>
+            <a:r>
+              <a:rPr lang="it-IT" sz="1400" dirty="0"/>
+              <a:t>angolo Pitch senza discontinuità</a:t>
+            </a:r>
+          </a:p>
+          <a:p>
+            <a:pPr marL="285750" lvl="0" indent="-285750" algn="l">
+              <a:buClr>
+                <a:schemeClr val="bg1"/>
+              </a:buClr>
+              <a:buFont typeface="Arial" panose="020B0604020202020204" pitchFamily="34" charset="0"/>
+              <a:buChar char="•"/>
+            </a:pPr>
+            <a:r>
+              <a:rPr lang="it-IT" sz="1400" dirty="0"/>
+              <a:t>angolo </a:t>
+            </a:r>
+            <a:r>
+              <a:rPr lang="it-IT" sz="1400" dirty="0" err="1" smtClean="0"/>
+              <a:t>Roll</a:t>
+            </a:r>
+            <a:endParaRPr lang="it-IT" sz="1400" dirty="0"/>
+          </a:p>
+          <a:p>
+            <a:pPr marL="285750" lvl="0" indent="-285750" algn="l">
+              <a:buClr>
+                <a:schemeClr val="bg1"/>
+              </a:buClr>
+              <a:buFont typeface="Arial" panose="020B0604020202020204" pitchFamily="34" charset="0"/>
+              <a:buChar char="•"/>
+            </a:pPr>
+            <a:r>
+              <a:rPr lang="it-IT" sz="1400" dirty="0"/>
+              <a:t>angolo </a:t>
+            </a:r>
+            <a:r>
+              <a:rPr lang="it-IT" sz="1400" dirty="0" err="1"/>
+              <a:t>Roll</a:t>
+            </a:r>
+            <a:r>
+              <a:rPr lang="it-IT" sz="1400" dirty="0"/>
+              <a:t> senza discontinuità</a:t>
+            </a:r>
+          </a:p>
+          <a:p>
+            <a:pPr marL="285750" lvl="0" indent="-285750" algn="l">
+              <a:buClr>
+                <a:schemeClr val="bg1"/>
+              </a:buClr>
+              <a:buFont typeface="Arial" panose="020B0604020202020204" pitchFamily="34" charset="0"/>
+              <a:buChar char="•"/>
+            </a:pPr>
+            <a:r>
+              <a:rPr lang="it-IT" sz="1400" dirty="0"/>
+              <a:t>dead </a:t>
+            </a:r>
+            <a:r>
+              <a:rPr lang="it-IT" sz="1400" dirty="0" err="1"/>
+              <a:t>reckoning</a:t>
+            </a:r>
+            <a:endParaRPr lang="it-IT" sz="1400" dirty="0"/>
+          </a:p>
+          <a:p>
+            <a:pPr algn="l"/>
+            <a:endParaRPr lang="it-IT" sz="1400" dirty="0" smtClean="0"/>
+          </a:p>
+          <a:p>
+            <a:pPr algn="l"/>
+            <a:endParaRPr lang="it-IT" sz="1400" dirty="0"/>
+          </a:p>
+        </p:txBody>
+      </p:sp>
+    </p:spTree>
+    <p:extLst>
+      <p:ext uri="{BB962C8B-B14F-4D97-AF65-F5344CB8AC3E}">
+        <p14:creationId xmlns:p14="http://schemas.microsoft.com/office/powerpoint/2010/main" val="2410872506"/>
+      </p:ext>
+    </p:extLst>
+  </p:cSld>
+  <p:clrMapOvr>
+    <a:masterClrMapping/>
+  </p:clrMapOvr>
+  <p:timing>
+    <p:tnLst>
+      <p:par>
+        <p:cTn id="1" dur="indefinite" restart="never" nodeType="tmRoot"/>
+      </p:par>
+    </p:tnLst>
+  </p:timing>
+</p:sld>
+</file>
+
+<file path=ppt/slides/slide7.xml><?xml version="1.0" encoding="utf-8"?>
+<p:sld xmlns:a="http://schemas.openxmlformats.org/drawingml/2006/main" xmlns:r="http://schemas.openxmlformats.org/officeDocument/2006/relationships" xmlns:p="http://schemas.openxmlformats.org/presentationml/2006/main">
+  <p:cSld>
+    <p:spTree>
+      <p:nvGrpSpPr>
+        <p:cNvPr id="1" name=""/>
+        <p:cNvGrpSpPr/>
+        <p:nvPr/>
+      </p:nvGrpSpPr>
+      <p:grpSpPr>
+        <a:xfrm>
+          <a:off x="0" y="0"/>
+          <a:ext cx="0" cy="0"/>
+          <a:chOff x="0" y="0"/>
+          <a:chExt cx="0" cy="0"/>
+        </a:xfrm>
+      </p:grpSpPr>
+      <p:sp>
+        <p:nvSpPr>
+          <p:cNvPr id="2" name="Titolo 1"/>
+          <p:cNvSpPr>
+            <a:spLocks noGrp="1"/>
+          </p:cNvSpPr>
+          <p:nvPr>
+            <p:ph type="ctrTitle"/>
+          </p:nvPr>
+        </p:nvSpPr>
+        <p:spPr>
+          <a:xfrm>
+            <a:off x="611560" y="476672"/>
+            <a:ext cx="7772400" cy="1008112"/>
+          </a:xfrm>
+        </p:spPr>
+        <p:txBody>
+          <a:bodyPr>
+            <a:normAutofit/>
+          </a:bodyPr>
+          <a:lstStyle/>
+          <a:p>
+            <a:r>
+              <a:rPr lang="it-IT" dirty="0" smtClean="0"/>
+              <a:t>VISUALIZZAZIONE DATI</a:t>
+            </a:r>
+            <a:endParaRPr lang="it-IT" dirty="0"/>
+          </a:p>
+        </p:txBody>
+      </p:sp>
+      <p:pic>
+        <p:nvPicPr>
+          <p:cNvPr id="1026" name="Picture 2" descr="C:\Users\Lorenzo\Pictures\grafici.PNG"/>
+          <p:cNvPicPr>
+            <a:picLocks noChangeAspect="1" noChangeArrowheads="1"/>
+          </p:cNvPicPr>
+          <p:nvPr/>
+        </p:nvPicPr>
+        <p:blipFill>
+          <a:blip r:embed="rId2">
+            <a:extLst>
+              <a:ext uri="{28A0092B-C50C-407E-A947-70E740481C1C}">
+                <a14:useLocalDpi xmlns:a14="http://schemas.microsoft.com/office/drawing/2010/main" val="0"/>
+              </a:ext>
+            </a:extLst>
+          </a:blip>
+          <a:srcRect/>
+          <a:stretch>
+            <a:fillRect/>
+          </a:stretch>
+        </p:blipFill>
+        <p:spPr bwMode="auto">
+          <a:xfrm>
+            <a:off x="1043608" y="1628800"/>
+            <a:ext cx="7077943" cy="4204055"/>
+          </a:xfrm>
+          <a:prstGeom prst="rect">
+            <a:avLst/>
+          </a:prstGeom>
+          <a:noFill/>
+          <a:extLst>
+            <a:ext uri="{909E8E84-426E-40DD-AFC4-6F175D3DCCD1}">
+              <a14:hiddenFill xmlns:a14="http://schemas.microsoft.com/office/drawing/2010/main">
+                <a:solidFill>
+                  <a:srgbClr val="FFFFFF"/>
+                </a:solidFill>
+              </a14:hiddenFill>
+            </a:ext>
+          </a:extLst>
+        </p:spPr>
+      </p:pic>
+    </p:spTree>
+    <p:extLst>
+      <p:ext uri="{BB962C8B-B14F-4D97-AF65-F5344CB8AC3E}">
+        <p14:creationId xmlns:p14="http://schemas.microsoft.com/office/powerpoint/2010/main" val="3117808283"/>
+      </p:ext>
+    </p:extLst>
+  </p:cSld>
+  <p:clrMapOvr>
+    <a:masterClrMapping/>
+  </p:clrMapOvr>
+  <p:timing>
+    <p:tnLst>
+      <p:par>
+        <p:cTn id="1" dur="indefinite" restart="never" nodeType="tmRoot"/>
+      </p:par>
+    </p:tnLst>
+  </p:timing>
+</p:sld>
+</file>
+
+<file path=ppt/slides/slide8.xml><?xml version="1.0" encoding="utf-8"?>
+<p:sld xmlns:a="http://schemas.openxmlformats.org/drawingml/2006/main" xmlns:r="http://schemas.openxmlformats.org/officeDocument/2006/relationships" xmlns:p="http://schemas.openxmlformats.org/presentationml/2006/main">
+  <p:cSld>
+    <p:spTree>
+      <p:nvGrpSpPr>
+        <p:cNvPr id="1" name=""/>
+        <p:cNvGrpSpPr/>
+        <p:nvPr/>
+      </p:nvGrpSpPr>
+      <p:grpSpPr>
+        <a:xfrm>
+          <a:off x="0" y="0"/>
+          <a:ext cx="0" cy="0"/>
+          <a:chOff x="0" y="0"/>
+          <a:chExt cx="0" cy="0"/>
+        </a:xfrm>
+      </p:grpSpPr>
+      <p:sp>
+        <p:nvSpPr>
+          <p:cNvPr id="2" name="Titolo 1"/>
+          <p:cNvSpPr>
+            <a:spLocks noGrp="1"/>
+          </p:cNvSpPr>
+          <p:nvPr>
+            <p:ph type="ctrTitle"/>
+          </p:nvPr>
+        </p:nvSpPr>
+        <p:spPr>
+          <a:xfrm>
+            <a:off x="611560" y="476672"/>
+            <a:ext cx="7772400" cy="1008112"/>
+          </a:xfrm>
+        </p:spPr>
+        <p:txBody>
+          <a:bodyPr>
+            <a:normAutofit/>
+          </a:bodyPr>
+          <a:lstStyle/>
+          <a:p>
+            <a:r>
+              <a:rPr lang="it-IT" dirty="0" smtClean="0"/>
+              <a:t>IDEA PER IL DEAD </a:t>
+            </a:r>
+            <a:r>
+              <a:rPr lang="en-US" dirty="0" smtClean="0"/>
+              <a:t>RECKONING</a:t>
+            </a:r>
+            <a:endParaRPr lang="it-IT" dirty="0"/>
+          </a:p>
+        </p:txBody>
+      </p:sp>
+      <p:sp>
+        <p:nvSpPr>
+          <p:cNvPr id="3" name="Sottotitolo 2"/>
+          <p:cNvSpPr>
+            <a:spLocks noGrp="1"/>
+          </p:cNvSpPr>
+          <p:nvPr>
+            <p:ph type="subTitle" idx="1"/>
+          </p:nvPr>
+        </p:nvSpPr>
+        <p:spPr>
+          <a:xfrm>
+            <a:off x="979138" y="1636856"/>
+            <a:ext cx="7049246" cy="3376319"/>
+          </a:xfrm>
+        </p:spPr>
+        <p:txBody>
+          <a:bodyPr>
+            <a:noAutofit/>
+          </a:bodyPr>
+          <a:lstStyle/>
+          <a:p>
+            <a:pPr algn="l"/>
+            <a:endParaRPr lang="it-IT" sz="1400" dirty="0" smtClean="0"/>
+          </a:p>
+          <a:p>
+            <a:pPr algn="l"/>
+            <a:endParaRPr lang="it-IT" sz="1400" dirty="0"/>
+          </a:p>
+        </p:txBody>
+      </p:sp>
+      <p:pic>
+        <p:nvPicPr>
+          <p:cNvPr id="2051" name="Picture 3" descr="C:\Users\Lorenzo\Pictures\SD Yaw.PNG"/>
+          <p:cNvPicPr>
+            <a:picLocks noChangeAspect="1" noChangeArrowheads="1"/>
+          </p:cNvPicPr>
+          <p:nvPr/>
+        </p:nvPicPr>
+        <p:blipFill>
+          <a:blip r:embed="rId2">
+            <a:extLst>
+              <a:ext uri="{28A0092B-C50C-407E-A947-70E740481C1C}">
+                <a14:useLocalDpi xmlns:a14="http://schemas.microsoft.com/office/drawing/2010/main" val="0"/>
+              </a:ext>
+            </a:extLst>
+          </a:blip>
+          <a:srcRect/>
+          <a:stretch>
+            <a:fillRect/>
+          </a:stretch>
+        </p:blipFill>
+        <p:spPr bwMode="auto">
+          <a:xfrm>
+            <a:off x="539552" y="1556792"/>
+            <a:ext cx="4037856" cy="4551000"/>
+          </a:xfrm>
+          <a:prstGeom prst="rect">
+            <a:avLst/>
+          </a:prstGeom>
+          <a:noFill/>
+          <a:extLst>
+            <a:ext uri="{909E8E84-426E-40DD-AFC4-6F175D3DCCD1}">
+              <a14:hiddenFill xmlns:a14="http://schemas.microsoft.com/office/drawing/2010/main">
+                <a:solidFill>
+                  <a:srgbClr val="FFFFFF"/>
+                </a:solidFill>
+              </a14:hiddenFill>
+            </a:ext>
+          </a:extLst>
+        </p:spPr>
+      </p:pic>
+      <p:pic>
+        <p:nvPicPr>
+          <p:cNvPr id="2052" name="Picture 4" descr="C:\Users\Lorenzo\Pictures\polari.PNG"/>
+          <p:cNvPicPr>
+            <a:picLocks noChangeAspect="1" noChangeArrowheads="1"/>
+          </p:cNvPicPr>
+          <p:nvPr/>
+        </p:nvPicPr>
+        <p:blipFill>
+          <a:blip r:embed="rId3">
+            <a:extLst>
+              <a:ext uri="{28A0092B-C50C-407E-A947-70E740481C1C}">
+                <a14:useLocalDpi xmlns:a14="http://schemas.microsoft.com/office/drawing/2010/main" val="0"/>
+              </a:ext>
+            </a:extLst>
+          </a:blip>
+          <a:srcRect/>
+          <a:stretch>
+            <a:fillRect/>
+          </a:stretch>
+        </p:blipFill>
+        <p:spPr bwMode="auto">
+          <a:xfrm>
+            <a:off x="4789603" y="1599137"/>
+            <a:ext cx="3984580" cy="4454761"/>
+          </a:xfrm>
+          <a:prstGeom prst="rect">
+            <a:avLst/>
+          </a:prstGeom>
+          <a:noFill/>
+          <a:extLst>
+            <a:ext uri="{909E8E84-426E-40DD-AFC4-6F175D3DCCD1}">
+              <a14:hiddenFill xmlns:a14="http://schemas.microsoft.com/office/drawing/2010/main">
+                <a:solidFill>
+                  <a:srgbClr val="FFFFFF"/>
+                </a:solidFill>
+              </a14:hiddenFill>
+            </a:ext>
+          </a:extLst>
+        </p:spPr>
+      </p:pic>
+    </p:spTree>
+    <p:extLst>
+      <p:ext uri="{BB962C8B-B14F-4D97-AF65-F5344CB8AC3E}">
+        <p14:creationId xmlns:p14="http://schemas.microsoft.com/office/powerpoint/2010/main" val="1447685229"/>
       </p:ext>
     </p:extLst>
   </p:cSld>

</xml_diff>